<commit_message>
Update Final Presentation.pptx with hill climbing and simulated annealing results
</commit_message>
<xml_diff>
--- a/Presentation/Final/Final Presentation.pptx
+++ b/Presentation/Final/Final Presentation.pptx
@@ -10,9 +10,10 @@
     <p:sldId id="294" r:id="rId7"/>
     <p:sldId id="295" r:id="rId8"/>
     <p:sldId id="296" r:id="rId9"/>
-    <p:sldId id="297" r:id="rId10"/>
-    <p:sldId id="298" r:id="rId11"/>
-    <p:sldId id="299" r:id="rId12"/>
+    <p:sldId id="300" r:id="rId10"/>
+    <p:sldId id="297" r:id="rId11"/>
+    <p:sldId id="298" r:id="rId12"/>
+    <p:sldId id="299" r:id="rId13"/>
   </p:sldIdLst>
   <p:sldSz cx="12192000" cy="6858000"/>
   <p:notesSz cx="6858000" cy="9144000"/>
@@ -588,7 +589,7 @@
           <a:p>
             <a:fld id="{EA0C0817-A112-4847-8014-A94B7D2A4EA3}" type="datetime1">
               <a:rPr lang="en-US" smtClean="0"/>
-              <a:t>11/9/2020</a:t>
+              <a:t>11/15/2020</a:t>
             </a:fld>
             <a:endParaRPr lang="en-US" dirty="0"/>
           </a:p>
@@ -790,7 +791,7 @@
           <a:p>
             <a:fld id="{7332B432-ACDA-4023-A761-2BAB76577B62}" type="datetime1">
               <a:rPr lang="en-US" smtClean="0"/>
-              <a:t>11/9/2020</a:t>
+              <a:t>11/15/2020</a:t>
             </a:fld>
             <a:endParaRPr lang="en-US" dirty="0"/>
           </a:p>
@@ -1389,7 +1390,7 @@
           <a:p>
             <a:fld id="{D9C646AA-F36E-4540-911D-FFFC0A0EF24A}" type="datetime1">
               <a:rPr lang="en-US" smtClean="0"/>
-              <a:t>11/9/2020</a:t>
+              <a:t>11/15/2020</a:t>
             </a:fld>
             <a:endParaRPr lang="en-US" dirty="0"/>
           </a:p>
@@ -1709,7 +1710,7 @@
           <a:p>
             <a:fld id="{69186D26-FA5F-4637-B602-B7C2DC34CFD4}" type="datetime1">
               <a:rPr lang="en-US" smtClean="0"/>
-              <a:t>11/9/2020</a:t>
+              <a:t>11/15/2020</a:t>
             </a:fld>
             <a:endParaRPr lang="en-US" dirty="0"/>
           </a:p>
@@ -2146,7 +2147,7 @@
           <a:p>
             <a:fld id="{8A7F15D8-96D1-4781-BC50-CA8A088B2FE4}" type="datetime1">
               <a:rPr lang="en-US" smtClean="0"/>
-              <a:t>11/9/2020</a:t>
+              <a:t>11/15/2020</a:t>
             </a:fld>
             <a:endParaRPr lang="en-US" dirty="0"/>
           </a:p>
@@ -2264,7 +2265,7 @@
           <a:p>
             <a:fld id="{F9A96C99-B8F8-4528-BD05-0E16E943DC09}" type="datetime1">
               <a:rPr lang="en-US" smtClean="0"/>
-              <a:t>11/9/2020</a:t>
+              <a:t>11/15/2020</a:t>
             </a:fld>
             <a:endParaRPr lang="en-US" dirty="0"/>
           </a:p>
@@ -2359,7 +2360,7 @@
           <a:p>
             <a:fld id="{03636942-C211-4B28-8DBD-C953E00AF71B}" type="datetime1">
               <a:rPr lang="en-US" smtClean="0"/>
-              <a:t>11/9/2020</a:t>
+              <a:t>11/15/2020</a:t>
             </a:fld>
             <a:endParaRPr lang="en-US" dirty="0"/>
           </a:p>
@@ -2776,7 +2777,7 @@
           <a:p>
             <a:fld id="{7E8D12A6-918A-48BD-8CB9-CA713993B0EA}" type="datetime1">
               <a:rPr lang="en-US" smtClean="0"/>
-              <a:t>11/9/2020</a:t>
+              <a:t>11/15/2020</a:t>
             </a:fld>
             <a:endParaRPr lang="en-US" dirty="0"/>
           </a:p>
@@ -3038,7 +3039,7 @@
             <a:fld id="{E778CE86-875F-4587-BCF6-FA054AFC0D53}" type="datetime1">
               <a:rPr lang="en-US" smtClean="0"/>
               <a:pPr/>
-              <a:t>11/9/2020</a:t>
+              <a:t>11/15/2020</a:t>
             </a:fld>
             <a:endParaRPr lang="en-US" dirty="0"/>
           </a:p>
@@ -3554,7 +3555,7 @@
           <a:p>
             <a:fld id="{F6FA2B21-3FCD-4721-B95C-427943F61125}" type="datetime1">
               <a:rPr lang="en-US" smtClean="0"/>
-              <a:t>11/9/2020</a:t>
+              <a:t>11/15/2020</a:t>
             </a:fld>
             <a:endParaRPr lang="en-US" dirty="0"/>
           </a:p>
@@ -4731,6 +4732,13 @@
               <a:t>…successfully trained a convolutional neural network using the data generated by hill climbing and simulated annealing.</a:t>
             </a:r>
           </a:p>
+          <a:p>
+            <a:pPr lvl="2"/>
+            <a:r>
+              <a:rPr lang="en-US" sz="1700" dirty="0"/>
+              <a:t>(Note to self: This one might not actually be ready by the time we present. Check in with Robert for a progress report.)</a:t>
+            </a:r>
+          </a:p>
         </p:txBody>
       </p:sp>
     </p:spTree>
@@ -4816,13 +4824,56 @@
           <a:p>
             <a:r>
               <a:rPr lang="en-US" sz="2000" dirty="0"/>
-              <a:t>The specifics of the hill climbing implementation, such as variables and success rate, will go here.</a:t>
+              <a:t>Our work on hill climbing and simulated annealing was divided into three parts:</a:t>
+            </a:r>
+          </a:p>
+          <a:p>
+            <a:pPr lvl="1"/>
+            <a:r>
+              <a:rPr lang="en-US" sz="1800" dirty="0"/>
+              <a:t>Vanilla hill climbing with no special puzzle parameters.</a:t>
+            </a:r>
+          </a:p>
+          <a:p>
+            <a:pPr lvl="1"/>
+            <a:r>
+              <a:rPr lang="en-US" sz="1800" dirty="0"/>
+              <a:t>Vanilla hill climbing with a puzzle with a single, unique optimal solution.</a:t>
+            </a:r>
+          </a:p>
+          <a:p>
+            <a:pPr lvl="1"/>
+            <a:r>
+              <a:rPr lang="en-US" sz="1800" dirty="0"/>
+              <a:t>Simulated annealing with a puzzle with a single, unique optimal solution.</a:t>
             </a:r>
           </a:p>
           <a:p>
             <a:r>
               <a:rPr lang="en-US" sz="2000" dirty="0"/>
-              <a:t>Anything left to do for this part of the project will go here.</a:t>
+              <a:t>The first of those proved to be the weakest implementation — if the puzzle lacked a single, unique optimal solution, vanilla hill climbing could rarely produce a globally optimal solution.</a:t>
+            </a:r>
+          </a:p>
+          <a:p>
+            <a:r>
+              <a:rPr lang="en-US" sz="2000" dirty="0"/>
+              <a:t>If there </a:t>
+            </a:r>
+            <a:r>
+              <a:rPr lang="en-US" sz="2000" i="1" dirty="0"/>
+              <a:t>was</a:t>
+            </a:r>
+            <a:r>
+              <a:rPr lang="en-US" sz="2000" dirty="0"/>
+              <a:t> a single, unique optimal solution, however, vanilla hill climbing </a:t>
+            </a:r>
+            <a:r>
+              <a:rPr lang="en-US" sz="2000" i="1" dirty="0"/>
+              <a:t>could</a:t>
+            </a:r>
+            <a:r>
+              <a:rPr lang="en-US" sz="2000" dirty="0"/>
+              <a:t> find it — given enough evaluations.</a:t>
             </a:r>
           </a:p>
         </p:txBody>
@@ -4862,7 +4913,7 @@
           <p:cNvPr id="2" name="Title 1">
             <a:extLst>
               <a:ext uri="{FF2B5EF4-FFF2-40B4-BE49-F238E27FC236}">
-                <a16:creationId xmlns:a16="http://schemas.microsoft.com/office/drawing/2014/main" id="{C7163C8E-B06B-4C54-90AD-A2C8E91013DF}"/>
+                <a16:creationId xmlns:a16="http://schemas.microsoft.com/office/drawing/2014/main" id="{CF73D406-4BA3-4193-B9AB-751146C54D67}"/>
               </a:ext>
             </a:extLst>
           </p:cNvPr>
@@ -4880,7 +4931,7 @@
           <a:p>
             <a:r>
               <a:rPr lang="en-US" dirty="0"/>
-              <a:t>Results: Simulated Annealing</a:t>
+              <a:t>Results: Hill Climbing (Cont.)</a:t>
             </a:r>
           </a:p>
         </p:txBody>
@@ -4890,7 +4941,7 @@
           <p:cNvPr id="3" name="Content Placeholder 2">
             <a:extLst>
               <a:ext uri="{FF2B5EF4-FFF2-40B4-BE49-F238E27FC236}">
-                <a16:creationId xmlns:a16="http://schemas.microsoft.com/office/drawing/2014/main" id="{FD94790F-C2EE-4292-8006-3AC4B55B20A0}"/>
+                <a16:creationId xmlns:a16="http://schemas.microsoft.com/office/drawing/2014/main" id="{3A6B422A-5BB4-4624-A557-E5AAD4C112CC}"/>
               </a:ext>
             </a:extLst>
           </p:cNvPr>
@@ -4898,33 +4949,66 @@
             <a:spLocks noGrp="1"/>
           </p:cNvSpPr>
           <p:nvPr>
-            <p:ph idx="1"/>
+            <p:ph sz="half" idx="1"/>
           </p:nvPr>
         </p:nvSpPr>
         <p:spPr/>
         <p:txBody>
-          <a:bodyPr>
-            <a:normAutofit/>
-          </a:bodyPr>
+          <a:bodyPr/>
           <a:lstStyle/>
           <a:p>
             <a:r>
-              <a:rPr lang="en-US" sz="2000" dirty="0"/>
-              <a:t>The specifics of the simulated annealing implementation, such as variables and success rate, will go here.</a:t>
-            </a:r>
-          </a:p>
-          <a:p>
-            <a:r>
-              <a:rPr lang="en-US" sz="2000" dirty="0"/>
-              <a:t>Anything left to do for this part of the project will go here.</a:t>
-            </a:r>
-          </a:p>
-        </p:txBody>
-      </p:sp>
+              <a:rPr lang="en-US" dirty="0"/>
+              <a:t>To the right, you can see sample results from vanilla hill climbing with an optimized puzzle.</a:t>
+            </a:r>
+          </a:p>
+          <a:p>
+            <a:r>
+              <a:rPr lang="en-US" dirty="0"/>
+              <a:t>In one trial, at 300 function evaluations, the algorithm was able to find a globally optimal solution.</a:t>
+            </a:r>
+          </a:p>
+          <a:p>
+            <a:r>
+              <a:rPr lang="en-US" dirty="0"/>
+              <a:t>This particular run was not representative of all runs with these parameters, however, which often required thousands of evaluations.</a:t>
+            </a:r>
+          </a:p>
+        </p:txBody>
+      </p:sp>
+      <p:pic>
+        <p:nvPicPr>
+          <p:cNvPr id="10" name="Content Placeholder 9" descr="A close up of a sign&#10;&#10;Description automatically generated">
+            <a:extLst>
+              <a:ext uri="{FF2B5EF4-FFF2-40B4-BE49-F238E27FC236}">
+                <a16:creationId xmlns:a16="http://schemas.microsoft.com/office/drawing/2014/main" id="{3AC6BC85-B88C-4463-96AE-B4EE44D8F52E}"/>
+              </a:ext>
+            </a:extLst>
+          </p:cNvPr>
+          <p:cNvPicPr>
+            <a:picLocks noGrp="1" noChangeAspect="1"/>
+          </p:cNvPicPr>
+          <p:nvPr>
+            <p:ph sz="half" idx="2"/>
+          </p:nvPr>
+        </p:nvPicPr>
+        <p:blipFill>
+          <a:blip r:embed="rId2"/>
+          <a:stretch>
+            <a:fillRect/>
+          </a:stretch>
+        </p:blipFill>
+        <p:spPr>
+          <a:xfrm>
+            <a:off x="8041255" y="2103438"/>
+            <a:ext cx="1503814" cy="3748087"/>
+          </a:xfrm>
+        </p:spPr>
+      </p:pic>
     </p:spTree>
     <p:extLst>
       <p:ext uri="{BB962C8B-B14F-4D97-AF65-F5344CB8AC3E}">
-        <p14:creationId xmlns:p14="http://schemas.microsoft.com/office/powerpoint/2010/main" val="3777218147"/>
+        <p14:creationId xmlns:p14="http://schemas.microsoft.com/office/powerpoint/2010/main" val="832658327"/>
       </p:ext>
     </p:extLst>
   </p:cSld>
@@ -4974,6 +5058,106 @@
           <a:p>
             <a:r>
               <a:rPr lang="en-US" dirty="0"/>
+              <a:t>Results: Simulated Annealing</a:t>
+            </a:r>
+          </a:p>
+        </p:txBody>
+      </p:sp>
+      <p:sp>
+        <p:nvSpPr>
+          <p:cNvPr id="3" name="Content Placeholder 2">
+            <a:extLst>
+              <a:ext uri="{FF2B5EF4-FFF2-40B4-BE49-F238E27FC236}">
+                <a16:creationId xmlns:a16="http://schemas.microsoft.com/office/drawing/2014/main" id="{FD94790F-C2EE-4292-8006-3AC4B55B20A0}"/>
+              </a:ext>
+            </a:extLst>
+          </p:cNvPr>
+          <p:cNvSpPr>
+            <a:spLocks noGrp="1"/>
+          </p:cNvSpPr>
+          <p:nvPr>
+            <p:ph idx="1"/>
+          </p:nvPr>
+        </p:nvSpPr>
+        <p:spPr/>
+        <p:txBody>
+          <a:bodyPr>
+            <a:normAutofit/>
+          </a:bodyPr>
+          <a:lstStyle/>
+          <a:p>
+            <a:r>
+              <a:rPr lang="en-US" sz="2000" dirty="0"/>
+              <a:t>Simulated annealing was found to be a much more robust algorithm than vanilla hill climbing, often producing globally optimal solutions in less than one thousand function evaluations.</a:t>
+            </a:r>
+          </a:p>
+          <a:p>
+            <a:r>
+              <a:rPr lang="en-US" sz="2000" dirty="0"/>
+              <a:t>“Often” does not mean “always,” however, and simulated annealing would still occasionally have trouble — in one instance, 8,700 evaluations were needed to find the global optimum.</a:t>
+            </a:r>
+          </a:p>
+          <a:p>
+            <a:r>
+              <a:rPr lang="en-US" sz="2000" dirty="0"/>
+              <a:t>This is still an improvement over vanilla hill climbing with the same puzzle parameters, though, which sometimes needed over 10,000 function evaluations to solve a problem of similar complexity.</a:t>
+            </a:r>
+          </a:p>
+        </p:txBody>
+      </p:sp>
+    </p:spTree>
+    <p:extLst>
+      <p:ext uri="{BB962C8B-B14F-4D97-AF65-F5344CB8AC3E}">
+        <p14:creationId xmlns:p14="http://schemas.microsoft.com/office/powerpoint/2010/main" val="3777218147"/>
+      </p:ext>
+    </p:extLst>
+  </p:cSld>
+  <p:clrMapOvr>
+    <a:masterClrMapping/>
+  </p:clrMapOvr>
+</p:sld>
+</file>
+
+<file path=ppt/slides/slide8.xml><?xml version="1.0" encoding="utf-8"?>
+<p:sld xmlns:a="http://schemas.openxmlformats.org/drawingml/2006/main" xmlns:r="http://schemas.openxmlformats.org/officeDocument/2006/relationships" xmlns:p="http://schemas.openxmlformats.org/presentationml/2006/main">
+  <p:cSld>
+    <p:spTree>
+      <p:nvGrpSpPr>
+        <p:cNvPr id="1" name=""/>
+        <p:cNvGrpSpPr/>
+        <p:nvPr/>
+      </p:nvGrpSpPr>
+      <p:grpSpPr>
+        <a:xfrm>
+          <a:off x="0" y="0"/>
+          <a:ext cx="0" cy="0"/>
+          <a:chOff x="0" y="0"/>
+          <a:chExt cx="0" cy="0"/>
+        </a:xfrm>
+      </p:grpSpPr>
+      <p:sp>
+        <p:nvSpPr>
+          <p:cNvPr id="2" name="Title 1">
+            <a:extLst>
+              <a:ext uri="{FF2B5EF4-FFF2-40B4-BE49-F238E27FC236}">
+                <a16:creationId xmlns:a16="http://schemas.microsoft.com/office/drawing/2014/main" id="{C7163C8E-B06B-4C54-90AD-A2C8E91013DF}"/>
+              </a:ext>
+            </a:extLst>
+          </p:cNvPr>
+          <p:cNvSpPr>
+            <a:spLocks noGrp="1"/>
+          </p:cNvSpPr>
+          <p:nvPr>
+            <p:ph type="title"/>
+          </p:nvPr>
+        </p:nvSpPr>
+        <p:spPr/>
+        <p:txBody>
+          <a:bodyPr/>
+          <a:lstStyle/>
+          <a:p>
+            <a:r>
+              <a:rPr lang="en-US" dirty="0"/>
               <a:t>Results: Convolutional/Deep Neural Network</a:t>
             </a:r>
           </a:p>
@@ -5028,7 +5212,7 @@
 </p:sld>
 </file>
 
-<file path=ppt/slides/slide8.xml><?xml version="1.0" encoding="utf-8"?>
+<file path=ppt/slides/slide9.xml><?xml version="1.0" encoding="utf-8"?>
 <p:sld xmlns:a="http://schemas.openxmlformats.org/drawingml/2006/main" xmlns:r="http://schemas.openxmlformats.org/officeDocument/2006/relationships" xmlns:p="http://schemas.openxmlformats.org/presentationml/2006/main">
   <p:cSld>
     <p:spTree>
@@ -5442,6 +5626,24 @@
 </file>
 
 <file path=customXml/item1.xml><?xml version="1.0" encoding="utf-8"?>
+<?mso-contentType ?>
+<FormTemplates xmlns="http://schemas.microsoft.com/sharepoint/v3/contenttype/forms">
+  <Display>DocumentLibraryForm</Display>
+  <Edit>DocumentLibraryForm</Edit>
+  <New>DocumentLibraryForm</New>
+</FormTemplates>
+</file>
+
+<file path=customXml/item2.xml><?xml version="1.0" encoding="utf-8"?>
+<p:properties xmlns:p="http://schemas.microsoft.com/office/2006/metadata/properties" xmlns:xsi="http://www.w3.org/2001/XMLSchema-instance" xmlns:pc="http://schemas.microsoft.com/office/infopath/2007/PartnerControls">
+  <documentManagement>
+    <Status xmlns="71af3243-3dd4-4a8d-8c0d-dd76da1f02a5">Not started</Status>
+    <MediaServiceKeyPoints xmlns="71af3243-3dd4-4a8d-8c0d-dd76da1f02a5" xsi:nil="true"/>
+  </documentManagement>
+</p:properties>
+</file>
+
+<file path=customXml/item3.xml><?xml version="1.0" encoding="utf-8"?>
 <ct:contentTypeSchema xmlns:ct="http://schemas.microsoft.com/office/2006/metadata/contentType" xmlns:ma="http://schemas.microsoft.com/office/2006/metadata/properties/metaAttributes" ct:_="" ma:_="" ma:contentTypeName="Document" ma:contentTypeID="0x01010079F111ED35F8CC479449609E8A0923A6" ma:contentTypeVersion="12" ma:contentTypeDescription="Create a new document." ma:contentTypeScope="" ma:versionID="a410dd7f93c95333ffa1b60ed6adedd1">
   <xsd:schema xmlns:xsd="http://www.w3.org/2001/XMLSchema" xmlns:xs="http://www.w3.org/2001/XMLSchema" xmlns:p="http://schemas.microsoft.com/office/2006/metadata/properties" xmlns:ns2="71af3243-3dd4-4a8d-8c0d-dd76da1f02a5" xmlns:ns3="16c05727-aa75-4e4a-9b5f-8a80a1165891" targetNamespace="http://schemas.microsoft.com/office/2006/metadata/properties" ma:root="true" ma:fieldsID="a936d9baba76aa3866493feff160faab" ns2:_="" ns3:_="">
     <xsd:import namespace="71af3243-3dd4-4a8d-8c0d-dd76da1f02a5"/>
@@ -5662,25 +5864,25 @@
 </ct:contentTypeSchema>
 </file>
 
-<file path=customXml/item2.xml><?xml version="1.0" encoding="utf-8"?>
-<p:properties xmlns:p="http://schemas.microsoft.com/office/2006/metadata/properties" xmlns:xsi="http://www.w3.org/2001/XMLSchema-instance" xmlns:pc="http://schemas.microsoft.com/office/infopath/2007/PartnerControls">
-  <documentManagement>
-    <Status xmlns="71af3243-3dd4-4a8d-8c0d-dd76da1f02a5">Not started</Status>
-    <MediaServiceKeyPoints xmlns="71af3243-3dd4-4a8d-8c0d-dd76da1f02a5" xsi:nil="true"/>
-  </documentManagement>
-</p:properties>
+<file path=customXml/itemProps1.xml><?xml version="1.0" encoding="utf-8"?>
+<ds:datastoreItem xmlns:ds="http://schemas.openxmlformats.org/officeDocument/2006/customXml" ds:itemID="{AE2713E1-6312-427E-BFCB-C5A5DA301373}">
+  <ds:schemaRefs>
+    <ds:schemaRef ds:uri="http://schemas.microsoft.com/sharepoint/v3/contenttype/forms"/>
+  </ds:schemaRefs>
+</ds:datastoreItem>
 </file>
 
-<file path=customXml/item3.xml><?xml version="1.0" encoding="utf-8"?>
-<?mso-contentType ?>
-<FormTemplates xmlns="http://schemas.microsoft.com/sharepoint/v3/contenttype/forms">
-  <Display>DocumentLibraryForm</Display>
-  <Edit>DocumentLibraryForm</Edit>
-  <New>DocumentLibraryForm</New>
-</FormTemplates>
+<file path=customXml/itemProps2.xml><?xml version="1.0" encoding="utf-8"?>
+<ds:datastoreItem xmlns:ds="http://schemas.openxmlformats.org/officeDocument/2006/customXml" ds:itemID="{52F3B215-496E-4790-A364-7C1C46DEC771}">
+  <ds:schemaRefs>
+    <ds:schemaRef ds:uri="http://schemas.microsoft.com/office/2006/metadata/properties"/>
+    <ds:schemaRef ds:uri="http://schemas.microsoft.com/office/infopath/2007/PartnerControls"/>
+    <ds:schemaRef ds:uri="71af3243-3dd4-4a8d-8c0d-dd76da1f02a5"/>
+  </ds:schemaRefs>
+</ds:datastoreItem>
 </file>
 
-<file path=customXml/itemProps1.xml><?xml version="1.0" encoding="utf-8"?>
+<file path=customXml/itemProps3.xml><?xml version="1.0" encoding="utf-8"?>
 <ds:datastoreItem xmlns:ds="http://schemas.openxmlformats.org/officeDocument/2006/customXml" ds:itemID="{50DB95DD-0319-4EE5-8C5C-9CEDF75E024B}">
   <ds:schemaRefs>
     <ds:schemaRef ds:uri="http://schemas.microsoft.com/office/2006/metadata/contentType"/>
@@ -5697,22 +5899,4 @@
     <ds:schemaRef ds:uri="http://schemas.microsoft.com/internal/obd"/>
   </ds:schemaRefs>
 </ds:datastoreItem>
-</file>
-
-<file path=customXml/itemProps2.xml><?xml version="1.0" encoding="utf-8"?>
-<ds:datastoreItem xmlns:ds="http://schemas.openxmlformats.org/officeDocument/2006/customXml" ds:itemID="{52F3B215-496E-4790-A364-7C1C46DEC771}">
-  <ds:schemaRefs>
-    <ds:schemaRef ds:uri="http://schemas.microsoft.com/office/2006/metadata/properties"/>
-    <ds:schemaRef ds:uri="http://schemas.microsoft.com/office/infopath/2007/PartnerControls"/>
-    <ds:schemaRef ds:uri="71af3243-3dd4-4a8d-8c0d-dd76da1f02a5"/>
-  </ds:schemaRefs>
-</ds:datastoreItem>
-</file>
-
-<file path=customXml/itemProps3.xml><?xml version="1.0" encoding="utf-8"?>
-<ds:datastoreItem xmlns:ds="http://schemas.openxmlformats.org/officeDocument/2006/customXml" ds:itemID="{AE2713E1-6312-427E-BFCB-C5A5DA301373}">
-  <ds:schemaRefs>
-    <ds:schemaRef ds:uri="http://schemas.microsoft.com/sharepoint/v3/contenttype/forms"/>
-  </ds:schemaRefs>
-</ds:datastoreItem>
 </file>
</xml_diff>